<commit_message>
Fix (chp4): Correction du  numéro des exercices
</commit_message>
<xml_diff>
--- a/source/Chapitre 4 - Structures répétitives.pptx
+++ b/source/Chapitre 4 - Structures répétitives.pptx
@@ -2198,7 +2198,7 @@
   <pc:docChgLst>
     <pc:chgData name="Ismaël Tuo" userId="fca7baf0e513a1e6" providerId="LiveId" clId="{8BCE4665-6EDB-41F8-9F11-1CAE811C4A26}"/>
     <pc:docChg chg="undo custSel modSld sldOrd">
-      <pc:chgData name="Ismaël Tuo" userId="fca7baf0e513a1e6" providerId="LiveId" clId="{8BCE4665-6EDB-41F8-9F11-1CAE811C4A26}" dt="2023-11-12T17:47:47.834" v="120" actId="33524"/>
+      <pc:chgData name="Ismaël Tuo" userId="fca7baf0e513a1e6" providerId="LiveId" clId="{8BCE4665-6EDB-41F8-9F11-1CAE811C4A26}" dt="2023-11-12T18:36:13.579" v="134" actId="20577"/>
       <pc:docMkLst>
         <pc:docMk/>
       </pc:docMkLst>
@@ -2705,12 +2705,20 @@
         </pc:spChg>
       </pc:sldChg>
       <pc:sldChg chg="modSp mod">
-        <pc:chgData name="Ismaël Tuo" userId="fca7baf0e513a1e6" providerId="LiveId" clId="{8BCE4665-6EDB-41F8-9F11-1CAE811C4A26}" dt="2023-11-12T17:47:32.827" v="118" actId="113"/>
+        <pc:chgData name="Ismaël Tuo" userId="fca7baf0e513a1e6" providerId="LiveId" clId="{8BCE4665-6EDB-41F8-9F11-1CAE811C4A26}" dt="2023-11-12T18:36:00.078" v="126" actId="20577"/>
         <pc:sldMkLst>
           <pc:docMk/>
           <pc:sldMk cId="2798052591" sldId="303"/>
         </pc:sldMkLst>
         <pc:spChg chg="mod">
+          <ac:chgData name="Ismaël Tuo" userId="fca7baf0e513a1e6" providerId="LiveId" clId="{8BCE4665-6EDB-41F8-9F11-1CAE811C4A26}" dt="2023-11-12T18:35:51.601" v="122" actId="20577"/>
+          <ac:spMkLst>
+            <pc:docMk/>
+            <pc:sldMk cId="2798052591" sldId="303"/>
+            <ac:spMk id="2" creationId="{A5ED8B08-0158-CE92-326A-ED80FC9E1F84}"/>
+          </ac:spMkLst>
+        </pc:spChg>
+        <pc:spChg chg="mod">
           <ac:chgData name="Ismaël Tuo" userId="fca7baf0e513a1e6" providerId="LiveId" clId="{8BCE4665-6EDB-41F8-9F11-1CAE811C4A26}" dt="2023-11-12T17:47:32.827" v="118" actId="113"/>
           <ac:spMkLst>
             <pc:docMk/>
@@ -2718,14 +2726,38 @@
             <ac:spMk id="6" creationId="{84F10693-2FE8-EFC8-8DB6-84BFD181D260}"/>
           </ac:spMkLst>
         </pc:spChg>
+        <pc:spChg chg="mod">
+          <ac:chgData name="Ismaël Tuo" userId="fca7baf0e513a1e6" providerId="LiveId" clId="{8BCE4665-6EDB-41F8-9F11-1CAE811C4A26}" dt="2023-11-12T18:35:55.267" v="124" actId="20577"/>
+          <ac:spMkLst>
+            <pc:docMk/>
+            <pc:sldMk cId="2798052591" sldId="303"/>
+            <ac:spMk id="10" creationId="{44D53B11-7BBF-0CA3-686D-74B2A88EB8A2}"/>
+          </ac:spMkLst>
+        </pc:spChg>
+        <pc:spChg chg="mod">
+          <ac:chgData name="Ismaël Tuo" userId="fca7baf0e513a1e6" providerId="LiveId" clId="{8BCE4665-6EDB-41F8-9F11-1CAE811C4A26}" dt="2023-11-12T18:36:00.078" v="126" actId="20577"/>
+          <ac:spMkLst>
+            <pc:docMk/>
+            <pc:sldMk cId="2798052591" sldId="303"/>
+            <ac:spMk id="14" creationId="{67F49EA9-5E59-4F7E-8BF8-95BDBB8DDC4D}"/>
+          </ac:spMkLst>
+        </pc:spChg>
       </pc:sldChg>
       <pc:sldChg chg="modSp mod">
-        <pc:chgData name="Ismaël Tuo" userId="fca7baf0e513a1e6" providerId="LiveId" clId="{8BCE4665-6EDB-41F8-9F11-1CAE811C4A26}" dt="2023-11-12T17:47:47.834" v="120" actId="33524"/>
+        <pc:chgData name="Ismaël Tuo" userId="fca7baf0e513a1e6" providerId="LiveId" clId="{8BCE4665-6EDB-41F8-9F11-1CAE811C4A26}" dt="2023-11-12T18:36:13.579" v="134" actId="20577"/>
         <pc:sldMkLst>
           <pc:docMk/>
           <pc:sldMk cId="4140448874" sldId="304"/>
         </pc:sldMkLst>
         <pc:spChg chg="mod">
+          <ac:chgData name="Ismaël Tuo" userId="fca7baf0e513a1e6" providerId="LiveId" clId="{8BCE4665-6EDB-41F8-9F11-1CAE811C4A26}" dt="2023-11-12T18:36:04.753" v="128" actId="20577"/>
+          <ac:spMkLst>
+            <pc:docMk/>
+            <pc:sldMk cId="4140448874" sldId="304"/>
+            <ac:spMk id="2" creationId="{A5ED8B08-0158-CE92-326A-ED80FC9E1F84}"/>
+          </ac:spMkLst>
+        </pc:spChg>
+        <pc:spChg chg="mod">
           <ac:chgData name="Ismaël Tuo" userId="fca7baf0e513a1e6" providerId="LiveId" clId="{8BCE4665-6EDB-41F8-9F11-1CAE811C4A26}" dt="2023-11-12T17:47:36.737" v="119" actId="113"/>
           <ac:spMkLst>
             <pc:docMk/>
@@ -2734,7 +2766,23 @@
           </ac:spMkLst>
         </pc:spChg>
         <pc:spChg chg="mod">
-          <ac:chgData name="Ismaël Tuo" userId="fca7baf0e513a1e6" providerId="LiveId" clId="{8BCE4665-6EDB-41F8-9F11-1CAE811C4A26}" dt="2023-11-12T17:47:47.834" v="120" actId="33524"/>
+          <ac:chgData name="Ismaël Tuo" userId="fca7baf0e513a1e6" providerId="LiveId" clId="{8BCE4665-6EDB-41F8-9F11-1CAE811C4A26}" dt="2023-11-12T18:36:11.060" v="132" actId="20577"/>
+          <ac:spMkLst>
+            <pc:docMk/>
+            <pc:sldMk cId="4140448874" sldId="304"/>
+            <ac:spMk id="7" creationId="{CE662353-0CA7-5AE4-20BF-22E436CAE893}"/>
+          </ac:spMkLst>
+        </pc:spChg>
+        <pc:spChg chg="mod">
+          <ac:chgData name="Ismaël Tuo" userId="fca7baf0e513a1e6" providerId="LiveId" clId="{8BCE4665-6EDB-41F8-9F11-1CAE811C4A26}" dt="2023-11-12T18:36:07.687" v="130" actId="20577"/>
+          <ac:spMkLst>
+            <pc:docMk/>
+            <pc:sldMk cId="4140448874" sldId="304"/>
+            <ac:spMk id="8" creationId="{5930879C-2935-9D97-5A73-FE0B01C5DD1A}"/>
+          </ac:spMkLst>
+        </pc:spChg>
+        <pc:spChg chg="mod">
+          <ac:chgData name="Ismaël Tuo" userId="fca7baf0e513a1e6" providerId="LiveId" clId="{8BCE4665-6EDB-41F8-9F11-1CAE811C4A26}" dt="2023-11-12T18:36:13.579" v="134" actId="20577"/>
           <ac:spMkLst>
             <pc:docMk/>
             <pc:sldMk cId="4140448874" sldId="304"/>
@@ -14036,7 +14084,7 @@
                 <a:latin typeface="Times New Roman" panose="02020603050405020304" pitchFamily="18" charset="0"/>
                 <a:cs typeface="Times New Roman" panose="02020603050405020304" pitchFamily="18" charset="0"/>
               </a:rPr>
-              <a:t>Exercice 12</a:t>
+              <a:t>Exercice 11</a:t>
             </a:r>
           </a:p>
         </p:txBody>
@@ -14112,7 +14160,7 @@
                 <a:latin typeface="Times New Roman" panose="02020603050405020304" pitchFamily="18" charset="0"/>
                 <a:cs typeface="Times New Roman" panose="02020603050405020304" pitchFamily="18" charset="0"/>
               </a:rPr>
-              <a:t>Exercice 13</a:t>
+              <a:t>Exercice 12</a:t>
             </a:r>
           </a:p>
         </p:txBody>
@@ -14285,7 +14333,7 @@
                 <a:latin typeface="Times New Roman" panose="02020603050405020304" pitchFamily="18" charset="0"/>
                 <a:cs typeface="Times New Roman" panose="02020603050405020304" pitchFamily="18" charset="0"/>
               </a:rPr>
-              <a:t>Exercice 14</a:t>
+              <a:t>Exercice 13</a:t>
             </a:r>
           </a:p>
         </p:txBody>
@@ -14488,7 +14536,7 @@
                 <a:latin typeface="Times New Roman" panose="02020603050405020304" pitchFamily="18" charset="0"/>
                 <a:cs typeface="Times New Roman" panose="02020603050405020304" pitchFamily="18" charset="0"/>
               </a:rPr>
-              <a:t>Exercice 15</a:t>
+              <a:t>Exercice 14</a:t>
             </a:r>
           </a:p>
         </p:txBody>
@@ -14526,7 +14574,7 @@
                 <a:latin typeface="Times New Roman" panose="02020603050405020304" pitchFamily="18" charset="0"/>
                 <a:cs typeface="Times New Roman" panose="02020603050405020304" pitchFamily="18" charset="0"/>
               </a:rPr>
-              <a:t>Reprendre l’algorithme de l’exercice 14 mais cette fois-ci il faut afficher la position à laquelle le nombre a été saisi. </a:t>
+              <a:t>Reprendre l’algorithme de l’exercice 13 mais cette fois-ci il faut afficher la position à laquelle le nombre a été saisi. </a:t>
             </a:r>
           </a:p>
           <a:p>
@@ -14573,7 +14621,7 @@
                 <a:latin typeface="Times New Roman" panose="02020603050405020304" pitchFamily="18" charset="0"/>
                 <a:cs typeface="Times New Roman" panose="02020603050405020304" pitchFamily="18" charset="0"/>
               </a:rPr>
-              <a:t>Exercice 16</a:t>
+              <a:t>Exercice 15</a:t>
             </a:r>
           </a:p>
         </p:txBody>
@@ -14611,7 +14659,21 @@
                 <a:latin typeface="Times New Roman" panose="02020603050405020304" pitchFamily="18" charset="0"/>
                 <a:cs typeface="Times New Roman" panose="02020603050405020304" pitchFamily="18" charset="0"/>
               </a:rPr>
-              <a:t>Reprendre l’exercice 15 mais cette fois-ci demander à l’utilisateur la quantité de nombres qu’il veut saisir et ensuite exécuter le programme en fonction de la quantité de nombres que l’utilisateur veut saisir. Attention aux fausses saisies sur la quantité par exemple s’il saisit un nombre négatif ou 0 afficher une erreur et redemander combien de nombres il veut saisir.</a:t>
+              <a:t>Reprendre </a:t>
+            </a:r>
+            <a:r>
+              <a:rPr lang="fr-FR" sz="2000">
+                <a:latin typeface="Times New Roman" panose="02020603050405020304" pitchFamily="18" charset="0"/>
+                <a:cs typeface="Times New Roman" panose="02020603050405020304" pitchFamily="18" charset="0"/>
+              </a:rPr>
+              <a:t>l’exercice 14 </a:t>
+            </a:r>
+            <a:r>
+              <a:rPr lang="fr-FR" sz="2000" dirty="0">
+                <a:latin typeface="Times New Roman" panose="02020603050405020304" pitchFamily="18" charset="0"/>
+                <a:cs typeface="Times New Roman" panose="02020603050405020304" pitchFamily="18" charset="0"/>
+              </a:rPr>
+              <a:t>mais cette fois-ci demander à l’utilisateur la quantité de nombres qu’il veut saisir et ensuite exécuter le programme en fonction de la quantité de nombres que l’utilisateur veut saisir. Attention aux fausses saisies sur la quantité par exemple s’il saisit un nombre négatif ou 0 afficher une erreur et redemander combien de nombres il veut saisir.</a:t>
             </a:r>
           </a:p>
         </p:txBody>

</xml_diff>

<commit_message>
Fix: Correction du chapitre 4
</commit_message>
<xml_diff>
--- a/source/Chapitre 4 - Structures répétitives.pptx
+++ b/source/Chapitre 4 - Structures répétitives.pptx
@@ -18,8 +18,8 @@
     <p:sldId id="292" r:id="rId9"/>
     <p:sldId id="290" r:id="rId10"/>
     <p:sldId id="297" r:id="rId11"/>
-    <p:sldId id="294" r:id="rId12"/>
-    <p:sldId id="293" r:id="rId13"/>
+    <p:sldId id="293" r:id="rId12"/>
+    <p:sldId id="294" r:id="rId13"/>
     <p:sldId id="296" r:id="rId14"/>
     <p:sldId id="295" r:id="rId15"/>
     <p:sldId id="298" r:id="rId16"/>
@@ -139,7 +139,7 @@
 <file path=ppt/revisionInfo.xml><?xml version="1.0" encoding="utf-8"?>
 <p1510:revInfo xmlns:a="http://schemas.openxmlformats.org/drawingml/2006/main" xmlns:r="http://schemas.openxmlformats.org/officeDocument/2006/relationships" xmlns:p1510="http://schemas.microsoft.com/office/powerpoint/2015/10/main">
   <p1510:revLst>
-    <p1510:client id="{8BCE4665-6EDB-41F8-9F11-1CAE811C4A26}" v="2" dt="2023-11-12T17:46:28.905"/>
+    <p1510:client id="{8BCE4665-6EDB-41F8-9F11-1CAE811C4A26}" v="3" dt="2024-03-24T14:08:08.012"/>
   </p1510:revLst>
 </p1510:revInfo>
 </file>
@@ -2198,7 +2198,7 @@
   <pc:docChgLst>
     <pc:chgData name="Ismaël Tuo" userId="fca7baf0e513a1e6" providerId="LiveId" clId="{8BCE4665-6EDB-41F8-9F11-1CAE811C4A26}"/>
     <pc:docChg chg="undo custSel modSld sldOrd">
-      <pc:chgData name="Ismaël Tuo" userId="fca7baf0e513a1e6" providerId="LiveId" clId="{8BCE4665-6EDB-41F8-9F11-1CAE811C4A26}" dt="2023-11-12T18:36:13.579" v="134" actId="20577"/>
+      <pc:chgData name="Ismaël Tuo" userId="fca7baf0e513a1e6" providerId="LiveId" clId="{8BCE4665-6EDB-41F8-9F11-1CAE811C4A26}" dt="2024-03-24T14:08:09.870" v="161" actId="1076"/>
       <pc:docMkLst>
         <pc:docMk/>
       </pc:docMkLst>
@@ -2403,8 +2403,8 @@
           </ac:spMkLst>
         </pc:spChg>
       </pc:sldChg>
-      <pc:sldChg chg="modSp mod">
-        <pc:chgData name="Ismaël Tuo" userId="fca7baf0e513a1e6" providerId="LiveId" clId="{8BCE4665-6EDB-41F8-9F11-1CAE811C4A26}" dt="2023-11-12T17:41:35.880" v="41" actId="114"/>
+      <pc:sldChg chg="addSp delSp modSp mod">
+        <pc:chgData name="Ismaël Tuo" userId="fca7baf0e513a1e6" providerId="LiveId" clId="{8BCE4665-6EDB-41F8-9F11-1CAE811C4A26}" dt="2024-03-24T14:07:58.331" v="158" actId="108"/>
         <pc:sldMkLst>
           <pc:docMk/>
           <pc:sldMk cId="499511550" sldId="292"/>
@@ -2441,9 +2441,33 @@
             <ac:spMk id="18" creationId="{0795CEBB-648D-F425-0C83-AB1360366109}"/>
           </ac:spMkLst>
         </pc:spChg>
+        <pc:picChg chg="add del mod">
+          <ac:chgData name="Ismaël Tuo" userId="fca7baf0e513a1e6" providerId="LiveId" clId="{8BCE4665-6EDB-41F8-9F11-1CAE811C4A26}" dt="2024-03-24T14:07:21.712" v="150" actId="478"/>
+          <ac:picMkLst>
+            <pc:docMk/>
+            <pc:sldMk cId="499511550" sldId="292"/>
+            <ac:picMk id="7" creationId="{74B2F023-C1F0-20AC-06B1-D31FB708D8E7}"/>
+          </ac:picMkLst>
+        </pc:picChg>
+        <pc:picChg chg="del">
+          <ac:chgData name="Ismaël Tuo" userId="fca7baf0e513a1e6" providerId="LiveId" clId="{8BCE4665-6EDB-41F8-9F11-1CAE811C4A26}" dt="2024-03-24T13:34:53.168" v="135" actId="478"/>
+          <ac:picMkLst>
+            <pc:docMk/>
+            <pc:sldMk cId="499511550" sldId="292"/>
+            <ac:picMk id="8" creationId="{1B85DD06-5A84-94C1-EBD3-88A7C8D8DCDE}"/>
+          </ac:picMkLst>
+        </pc:picChg>
+        <pc:picChg chg="add mod">
+          <ac:chgData name="Ismaël Tuo" userId="fca7baf0e513a1e6" providerId="LiveId" clId="{8BCE4665-6EDB-41F8-9F11-1CAE811C4A26}" dt="2024-03-24T14:07:58.331" v="158" actId="108"/>
+          <ac:picMkLst>
+            <pc:docMk/>
+            <pc:sldMk cId="499511550" sldId="292"/>
+            <ac:picMk id="12" creationId="{E26747B2-CD2B-118B-8860-7E80C8B4F7C2}"/>
+          </ac:picMkLst>
+        </pc:picChg>
       </pc:sldChg>
       <pc:sldChg chg="modSp mod ord">
-        <pc:chgData name="Ismaël Tuo" userId="fca7baf0e513a1e6" providerId="LiveId" clId="{8BCE4665-6EDB-41F8-9F11-1CAE811C4A26}" dt="2023-11-12T17:44:31.118" v="84"/>
+        <pc:chgData name="Ismaël Tuo" userId="fca7baf0e513a1e6" providerId="LiveId" clId="{8BCE4665-6EDB-41F8-9F11-1CAE811C4A26}" dt="2024-03-24T13:48:41.204" v="149" actId="20577"/>
         <pc:sldMkLst>
           <pc:docMk/>
           <pc:sldMk cId="2297585284" sldId="293"/>
@@ -2457,7 +2481,7 @@
           </ac:spMkLst>
         </pc:spChg>
         <pc:spChg chg="mod">
-          <ac:chgData name="Ismaël Tuo" userId="fca7baf0e513a1e6" providerId="LiveId" clId="{8BCE4665-6EDB-41F8-9F11-1CAE811C4A26}" dt="2023-11-12T17:43:04.912" v="64" actId="114"/>
+          <ac:chgData name="Ismaël Tuo" userId="fca7baf0e513a1e6" providerId="LiveId" clId="{8BCE4665-6EDB-41F8-9F11-1CAE811C4A26}" dt="2024-03-24T13:48:41.204" v="149" actId="20577"/>
           <ac:spMkLst>
             <pc:docMk/>
             <pc:sldMk cId="2297585284" sldId="293"/>
@@ -2473,8 +2497,8 @@
           </ac:spMkLst>
         </pc:spChg>
       </pc:sldChg>
-      <pc:sldChg chg="modSp mod">
-        <pc:chgData name="Ismaël Tuo" userId="fca7baf0e513a1e6" providerId="LiveId" clId="{8BCE4665-6EDB-41F8-9F11-1CAE811C4A26}" dt="2023-11-12T17:43:32.377" v="71" actId="114"/>
+      <pc:sldChg chg="modSp mod ord">
+        <pc:chgData name="Ismaël Tuo" userId="fca7baf0e513a1e6" providerId="LiveId" clId="{8BCE4665-6EDB-41F8-9F11-1CAE811C4A26}" dt="2024-03-24T13:43:22.681" v="147"/>
         <pc:sldMkLst>
           <pc:docMk/>
           <pc:sldMk cId="367398369" sldId="294"/>
@@ -2635,8 +2659,8 @@
           </ac:spMkLst>
         </pc:spChg>
       </pc:sldChg>
-      <pc:sldChg chg="modSp mod">
-        <pc:chgData name="Ismaël Tuo" userId="fca7baf0e513a1e6" providerId="LiveId" clId="{8BCE4665-6EDB-41F8-9F11-1CAE811C4A26}" dt="2023-11-12T17:46:54.568" v="114" actId="114"/>
+      <pc:sldChg chg="addSp delSp modSp mod">
+        <pc:chgData name="Ismaël Tuo" userId="fca7baf0e513a1e6" providerId="LiveId" clId="{8BCE4665-6EDB-41F8-9F11-1CAE811C4A26}" dt="2024-03-24T14:08:09.870" v="161" actId="1076"/>
         <pc:sldMkLst>
           <pc:docMk/>
           <pc:sldMk cId="2187541620" sldId="300"/>
@@ -2665,6 +2689,22 @@
             <ac:spMk id="15" creationId="{26E08B24-44DE-D315-B26E-4234A03805D2}"/>
           </ac:spMkLst>
         </pc:spChg>
+        <pc:picChg chg="add mod">
+          <ac:chgData name="Ismaël Tuo" userId="fca7baf0e513a1e6" providerId="LiveId" clId="{8BCE4665-6EDB-41F8-9F11-1CAE811C4A26}" dt="2024-03-24T14:08:09.870" v="161" actId="1076"/>
+          <ac:picMkLst>
+            <pc:docMk/>
+            <pc:sldMk cId="2187541620" sldId="300"/>
+            <ac:picMk id="2" creationId="{3F398971-BAAE-2597-B788-0656F15A2C93}"/>
+          </ac:picMkLst>
+        </pc:picChg>
+        <pc:picChg chg="del">
+          <ac:chgData name="Ismaël Tuo" userId="fca7baf0e513a1e6" providerId="LiveId" clId="{8BCE4665-6EDB-41F8-9F11-1CAE811C4A26}" dt="2024-03-24T14:08:07.655" v="159" actId="478"/>
+          <ac:picMkLst>
+            <pc:docMk/>
+            <pc:sldMk cId="2187541620" sldId="300"/>
+            <ac:picMk id="9" creationId="{8A0DBBBE-4927-37C5-E79B-47731D9A0D3A}"/>
+          </ac:picMkLst>
+        </pc:picChg>
       </pc:sldChg>
       <pc:sldChg chg="modSp mod">
         <pc:chgData name="Ismaël Tuo" userId="fca7baf0e513a1e6" providerId="LiveId" clId="{8BCE4665-6EDB-41F8-9F11-1CAE811C4A26}" dt="2023-11-12T17:47:01.005" v="115" actId="113"/>
@@ -2947,7 +2987,7 @@
           <a:p>
             <a:fld id="{5D1B8971-FAD5-A544-A565-5C81831E2E08}" type="datetimeFigureOut">
               <a:rPr lang="fr-FR" smtClean="0"/>
-              <a:t>12/11/2023</a:t>
+              <a:t>24/03/2024</a:t>
             </a:fld>
             <a:endParaRPr lang="fr-FR"/>
           </a:p>
@@ -3375,7 +3415,7 @@
     </p:spTree>
     <p:extLst>
       <p:ext uri="{BB962C8B-B14F-4D97-AF65-F5344CB8AC3E}">
-        <p14:creationId xmlns:p14="http://schemas.microsoft.com/office/powerpoint/2010/main" val="967267600"/>
+        <p14:creationId xmlns:p14="http://schemas.microsoft.com/office/powerpoint/2010/main" val="3726014628"/>
       </p:ext>
     </p:extLst>
   </p:cSld>
@@ -4803,7 +4843,7 @@
     </p:spTree>
     <p:extLst>
       <p:ext uri="{BB962C8B-B14F-4D97-AF65-F5344CB8AC3E}">
-        <p14:creationId xmlns:p14="http://schemas.microsoft.com/office/powerpoint/2010/main" val="3726014628"/>
+        <p14:creationId xmlns:p14="http://schemas.microsoft.com/office/powerpoint/2010/main" val="967267600"/>
       </p:ext>
     </p:extLst>
   </p:cSld>
@@ -4976,7 +5016,7 @@
           <a:p>
             <a:fld id="{446AF453-C717-E044-9B61-C449088DBB9F}" type="datetime1">
               <a:rPr lang="fr-FR" smtClean="0"/>
-              <a:t>12/11/2023</a:t>
+              <a:t>24/03/2024</a:t>
             </a:fld>
             <a:endParaRPr lang="fr-FR"/>
           </a:p>
@@ -5150,7 +5190,7 @@
           <a:p>
             <a:fld id="{0AD74B8B-4B66-A54B-A7E1-EB9F6C09CE67}" type="datetime1">
               <a:rPr lang="fr-FR" smtClean="0"/>
-              <a:t>12/11/2023</a:t>
+              <a:t>24/03/2024</a:t>
             </a:fld>
             <a:endParaRPr lang="fr-FR"/>
           </a:p>
@@ -5334,7 +5374,7 @@
           <a:p>
             <a:fld id="{9584F9F2-42A0-CD42-8013-986AEAF97421}" type="datetime1">
               <a:rPr lang="fr-FR" smtClean="0"/>
-              <a:t>12/11/2023</a:t>
+              <a:t>24/03/2024</a:t>
             </a:fld>
             <a:endParaRPr lang="fr-FR"/>
           </a:p>
@@ -5508,7 +5548,7 @@
           <a:p>
             <a:fld id="{DAB9BD9F-3179-BB4C-96AB-C40862581685}" type="datetime1">
               <a:rPr lang="fr-FR" smtClean="0"/>
-              <a:t>12/11/2023</a:t>
+              <a:t>24/03/2024</a:t>
             </a:fld>
             <a:endParaRPr lang="fr-FR"/>
           </a:p>
@@ -5780,7 +5820,7 @@
           <a:p>
             <a:fld id="{A664DE96-64FF-BC43-8A9C-18ED43A528D6}" type="datetime1">
               <a:rPr lang="fr-FR" smtClean="0"/>
-              <a:t>12/11/2023</a:t>
+              <a:t>24/03/2024</a:t>
             </a:fld>
             <a:endParaRPr lang="fr-FR"/>
           </a:p>
@@ -6016,7 +6056,7 @@
           <a:p>
             <a:fld id="{2C8FE800-9F9B-1C4F-A1CD-9EF46842C4CA}" type="datetime1">
               <a:rPr lang="fr-FR" smtClean="0"/>
-              <a:t>12/11/2023</a:t>
+              <a:t>24/03/2024</a:t>
             </a:fld>
             <a:endParaRPr lang="fr-FR"/>
           </a:p>
@@ -6379,7 +6419,7 @@
           <a:p>
             <a:fld id="{0F7DED4E-8CB4-EF40-A349-EFC02EC7784E}" type="datetime1">
               <a:rPr lang="fr-FR" smtClean="0"/>
-              <a:t>12/11/2023</a:t>
+              <a:t>24/03/2024</a:t>
             </a:fld>
             <a:endParaRPr lang="fr-FR"/>
           </a:p>
@@ -6524,7 +6564,7 @@
           <a:p>
             <a:fld id="{5BB88D77-E8A2-E24F-81D2-817E60779F3E}" type="datetime1">
               <a:rPr lang="fr-FR" smtClean="0"/>
-              <a:t>12/11/2023</a:t>
+              <a:t>24/03/2024</a:t>
             </a:fld>
             <a:endParaRPr lang="fr-FR"/>
           </a:p>
@@ -6623,7 +6663,7 @@
           <a:p>
             <a:fld id="{817F964E-5B57-884A-A1B8-925BFA5276AF}" type="datetime1">
               <a:rPr lang="fr-FR" smtClean="0"/>
-              <a:t>12/11/2023</a:t>
+              <a:t>24/03/2024</a:t>
             </a:fld>
             <a:endParaRPr lang="fr-FR"/>
           </a:p>
@@ -6984,7 +7024,7 @@
           <a:p>
             <a:fld id="{D5636CD0-A2E6-1543-A0E5-C829C16FEE55}" type="datetime1">
               <a:rPr lang="fr-FR" smtClean="0"/>
-              <a:t>12/11/2023</a:t>
+              <a:t>24/03/2024</a:t>
             </a:fld>
             <a:endParaRPr lang="fr-FR"/>
           </a:p>
@@ -7345,7 +7385,7 @@
           <a:p>
             <a:fld id="{CEE5CE4A-5B1A-1846-BA66-722BDB7A9525}" type="datetime1">
               <a:rPr lang="fr-FR" smtClean="0"/>
-              <a:t>12/11/2023</a:t>
+              <a:t>24/03/2024</a:t>
             </a:fld>
             <a:endParaRPr lang="fr-FR"/>
           </a:p>
@@ -7592,7 +7632,7 @@
           <a:p>
             <a:fld id="{55A13D9C-CA6E-9C45-8634-4423EBFFD553}" type="datetime1">
               <a:rPr lang="fr-FR" smtClean="0"/>
-              <a:t>12/11/2023</a:t>
+              <a:t>24/03/2024</a:t>
             </a:fld>
             <a:endParaRPr lang="fr-FR"/>
           </a:p>
@@ -8827,7 +8867,7 @@
                 <a:latin typeface="Times New Roman" panose="02020603050405020304" pitchFamily="18" charset="0"/>
                 <a:cs typeface="Times New Roman" panose="02020603050405020304" pitchFamily="18" charset="0"/>
               </a:rPr>
-              <a:t>break</a:t>
+              <a:t>continue</a:t>
             </a:r>
           </a:p>
         </p:txBody>
@@ -8846,8 +8886,8 @@
         </p:nvSpPr>
         <p:spPr>
           <a:xfrm>
-            <a:off x="442743" y="754534"/>
-            <a:ext cx="11236639" cy="707886"/>
+            <a:off x="442743" y="767486"/>
+            <a:ext cx="11344704" cy="707886"/>
           </a:xfrm>
           <a:prstGeom prst="rect">
             <a:avLst/>
@@ -8865,57 +8905,68 @@
                 <a:latin typeface="Times New Roman" panose="02020603050405020304" pitchFamily="18" charset="0"/>
                 <a:cs typeface="Times New Roman" panose="02020603050405020304" pitchFamily="18" charset="0"/>
               </a:rPr>
-              <a:t>Contrairement à </a:t>
+              <a:t>Le mot-clé </a:t>
+            </a:r>
+            <a:r>
+              <a:rPr lang="fr-FR" sz="2000" b="1" i="1" dirty="0">
+                <a:latin typeface="Times New Roman" panose="02020603050405020304" pitchFamily="18" charset="0"/>
+                <a:cs typeface="Times New Roman" panose="02020603050405020304" pitchFamily="18" charset="0"/>
+              </a:rPr>
+              <a:t>continue</a:t>
             </a:r>
             <a:r>
               <a:rPr lang="fr-FR" sz="2000" b="1" dirty="0">
                 <a:latin typeface="Times New Roman" panose="02020603050405020304" pitchFamily="18" charset="0"/>
                 <a:cs typeface="Times New Roman" panose="02020603050405020304" pitchFamily="18" charset="0"/>
               </a:rPr>
-              <a:t>l’instruction </a:t>
+              <a:t> </a:t>
+            </a:r>
+            <a:r>
+              <a:rPr lang="fr-FR" sz="2000" dirty="0">
+                <a:latin typeface="Times New Roman" panose="02020603050405020304" pitchFamily="18" charset="0"/>
+                <a:cs typeface="Times New Roman" panose="02020603050405020304" pitchFamily="18" charset="0"/>
+              </a:rPr>
+              <a:t>en Python est utilisé dans les boucles pour continuer la boucle en repartant directement à la ligne de la condition du </a:t>
+            </a:r>
+            <a:r>
+              <a:rPr lang="fr-FR" sz="2000" b="1" i="1" dirty="0" err="1">
+                <a:latin typeface="Times New Roman" panose="02020603050405020304" pitchFamily="18" charset="0"/>
+                <a:cs typeface="Times New Roman" panose="02020603050405020304" pitchFamily="18" charset="0"/>
+              </a:rPr>
+              <a:t>while</a:t>
+            </a:r>
+            <a:r>
+              <a:rPr lang="fr-FR" sz="2000" b="1" dirty="0">
+                <a:latin typeface="Times New Roman" panose="02020603050405020304" pitchFamily="18" charset="0"/>
+                <a:cs typeface="Times New Roman" panose="02020603050405020304" pitchFamily="18" charset="0"/>
+              </a:rPr>
+              <a:t> </a:t>
+            </a:r>
+            <a:r>
+              <a:rPr lang="fr-FR" sz="2000" dirty="0">
+                <a:latin typeface="Times New Roman" panose="02020603050405020304" pitchFamily="18" charset="0"/>
+                <a:cs typeface="Times New Roman" panose="02020603050405020304" pitchFamily="18" charset="0"/>
+              </a:rPr>
+              <a:t>ou du </a:t>
             </a:r>
             <a:r>
               <a:rPr lang="fr-FR" sz="2000" b="1" i="1" dirty="0">
                 <a:latin typeface="Times New Roman" panose="02020603050405020304" pitchFamily="18" charset="0"/>
                 <a:cs typeface="Times New Roman" panose="02020603050405020304" pitchFamily="18" charset="0"/>
               </a:rPr>
-              <a:t>continue</a:t>
+              <a:t>for</a:t>
             </a:r>
             <a:r>
               <a:rPr lang="fr-FR" sz="2000" b="1" dirty="0">
                 <a:latin typeface="Times New Roman" panose="02020603050405020304" pitchFamily="18" charset="0"/>
                 <a:cs typeface="Times New Roman" panose="02020603050405020304" pitchFamily="18" charset="0"/>
               </a:rPr>
-              <a:t>, </a:t>
-            </a:r>
-            <a:r>
-              <a:rPr lang="fr-FR" sz="2000" dirty="0">
-                <a:latin typeface="Times New Roman" panose="02020603050405020304" pitchFamily="18" charset="0"/>
-                <a:cs typeface="Times New Roman" panose="02020603050405020304" pitchFamily="18" charset="0"/>
-              </a:rPr>
-              <a:t>ici le mot-clé </a:t>
-            </a:r>
-            <a:r>
-              <a:rPr lang="fr-FR" sz="2000" b="1" i="1" dirty="0">
-                <a:latin typeface="Times New Roman" panose="02020603050405020304" pitchFamily="18" charset="0"/>
-                <a:cs typeface="Times New Roman" panose="02020603050405020304" pitchFamily="18" charset="0"/>
-              </a:rPr>
-              <a:t>break</a:t>
-            </a:r>
-            <a:r>
-              <a:rPr lang="fr-FR" sz="2000" b="1" dirty="0">
-                <a:latin typeface="Times New Roman" panose="02020603050405020304" pitchFamily="18" charset="0"/>
-                <a:cs typeface="Times New Roman" panose="02020603050405020304" pitchFamily="18" charset="0"/>
-              </a:rPr>
-              <a:t> </a:t>
-            </a:r>
-            <a:r>
-              <a:rPr lang="fr-FR" sz="2000" dirty="0">
-                <a:latin typeface="Times New Roman" panose="02020603050405020304" pitchFamily="18" charset="0"/>
-                <a:cs typeface="Times New Roman" panose="02020603050405020304" pitchFamily="18" charset="0"/>
-              </a:rPr>
-              <a:t>dans une boucle permet de la stopper complètement. Elle permettra par exemple de sortir des boucles infinies dans un programme.</a:t>
-            </a:r>
+              <a:t>.</a:t>
+            </a:r>
+            <a:endParaRPr lang="fr-FR" sz="2000" dirty="0">
+              <a:latin typeface="Times New Roman" panose="02020603050405020304" pitchFamily="18" charset="0"/>
+              <a:cs typeface="Times New Roman" panose="02020603050405020304" pitchFamily="18" charset="0"/>
+            </a:endParaRPr>
           </a:p>
         </p:txBody>
       </p:sp>
@@ -8958,12 +9009,50 @@
           </a:fontRef>
         </p:style>
       </p:cxnSp>
+      <p:sp>
+        <p:nvSpPr>
+          <p:cNvPr id="2" name="ZoneTexte 1">
+            <a:extLst>
+              <a:ext uri="{FF2B5EF4-FFF2-40B4-BE49-F238E27FC236}">
+                <a16:creationId xmlns:a16="http://schemas.microsoft.com/office/drawing/2014/main" id="{DC9E53F9-4B63-72E9-FEF0-8F1A4E56D9B7}"/>
+              </a:ext>
+            </a:extLst>
+          </p:cNvPr>
+          <p:cNvSpPr txBox="1"/>
+          <p:nvPr/>
+        </p:nvSpPr>
+        <p:spPr>
+          <a:xfrm>
+            <a:off x="442743" y="1481347"/>
+            <a:ext cx="11344704" cy="400110"/>
+          </a:xfrm>
+          <a:prstGeom prst="rect">
+            <a:avLst/>
+          </a:prstGeom>
+          <a:noFill/>
+        </p:spPr>
+        <p:txBody>
+          <a:bodyPr wrap="square" rtlCol="0">
+            <a:spAutoFit/>
+          </a:bodyPr>
+          <a:lstStyle/>
+          <a:p>
+            <a:r>
+              <a:rPr lang="fr-FR" sz="2000" dirty="0">
+                <a:latin typeface="Times New Roman" panose="02020603050405020304" pitchFamily="18" charset="0"/>
+                <a:cs typeface="Times New Roman" panose="02020603050405020304" pitchFamily="18" charset="0"/>
+              </a:rPr>
+              <a:t>Par exemple si on veut afficher la liste des nombres de 0 à 10 sauf le nombre 2 on aura:</a:t>
+            </a:r>
+          </a:p>
+        </p:txBody>
+      </p:sp>
       <p:pic>
         <p:nvPicPr>
-          <p:cNvPr id="2" name="Image 1">
-            <a:extLst>
-              <a:ext uri="{FF2B5EF4-FFF2-40B4-BE49-F238E27FC236}">
-                <a16:creationId xmlns:a16="http://schemas.microsoft.com/office/drawing/2014/main" id="{C4D1BCE3-F59E-D195-11EB-4525B95A92EC}"/>
+          <p:cNvPr id="8" name="Image 7">
+            <a:extLst>
+              <a:ext uri="{FF2B5EF4-FFF2-40B4-BE49-F238E27FC236}">
+                <a16:creationId xmlns:a16="http://schemas.microsoft.com/office/drawing/2014/main" id="{FE3553F1-79C8-8C5A-5356-1B0F2B7DAC60}"/>
               </a:ext>
             </a:extLst>
           </p:cNvPr>
@@ -8980,50 +9069,20 @@
         </p:blipFill>
         <p:spPr>
           <a:xfrm>
-            <a:off x="500932" y="1543446"/>
-            <a:ext cx="6158747" cy="2804035"/>
+            <a:off x="7958282" y="1987004"/>
+            <a:ext cx="3721100" cy="3237304"/>
           </a:xfrm>
           <a:prstGeom prst="rect">
             <a:avLst/>
           </a:prstGeom>
         </p:spPr>
       </p:pic>
-      <p:pic>
-        <p:nvPicPr>
-          <p:cNvPr id="7" name="Image 6">
-            <a:extLst>
-              <a:ext uri="{FF2B5EF4-FFF2-40B4-BE49-F238E27FC236}">
-                <a16:creationId xmlns:a16="http://schemas.microsoft.com/office/drawing/2014/main" id="{C7DF9E86-DE33-0136-F412-BE640BC767B5}"/>
-              </a:ext>
-            </a:extLst>
-          </p:cNvPr>
-          <p:cNvPicPr>
-            <a:picLocks noChangeAspect="1"/>
-          </p:cNvPicPr>
-          <p:nvPr/>
-        </p:nvPicPr>
-        <p:blipFill>
-          <a:blip r:embed="rId4"/>
-          <a:stretch>
-            <a:fillRect/>
-          </a:stretch>
-        </p:blipFill>
-        <p:spPr>
-          <a:xfrm>
-            <a:off x="8504380" y="1668212"/>
-            <a:ext cx="3175000" cy="1485900"/>
-          </a:xfrm>
-          <a:prstGeom prst="rect">
-            <a:avLst/>
-          </a:prstGeom>
-        </p:spPr>
-      </p:pic>
-      <p:sp>
-        <p:nvSpPr>
-          <p:cNvPr id="8" name="Flèche vers la droite 7">
-            <a:extLst>
-              <a:ext uri="{FF2B5EF4-FFF2-40B4-BE49-F238E27FC236}">
-                <a16:creationId xmlns:a16="http://schemas.microsoft.com/office/drawing/2014/main" id="{49FE3878-3BA4-C878-4C31-D5D7872BBC38}"/>
+      <p:sp>
+        <p:nvSpPr>
+          <p:cNvPr id="9" name="Flèche vers la droite 8">
+            <a:extLst>
+              <a:ext uri="{FF2B5EF4-FFF2-40B4-BE49-F238E27FC236}">
+                <a16:creationId xmlns:a16="http://schemas.microsoft.com/office/drawing/2014/main" id="{E4EAF5A7-3AFE-58A6-8244-D1A2FFCB5565}"/>
               </a:ext>
             </a:extLst>
           </p:cNvPr>
@@ -9032,8 +9091,8 @@
         </p:nvSpPr>
         <p:spPr>
           <a:xfrm>
-            <a:off x="6813534" y="2113200"/>
-            <a:ext cx="1536991" cy="756458"/>
+            <a:off x="5769608" y="3128140"/>
+            <a:ext cx="2018089" cy="756458"/>
           </a:xfrm>
           <a:prstGeom prst="rightArrow">
             <a:avLst/>
@@ -9072,10 +9131,10 @@
       </p:sp>
       <p:sp>
         <p:nvSpPr>
-          <p:cNvPr id="9" name="ZoneTexte 8">
-            <a:extLst>
-              <a:ext uri="{FF2B5EF4-FFF2-40B4-BE49-F238E27FC236}">
-                <a16:creationId xmlns:a16="http://schemas.microsoft.com/office/drawing/2014/main" id="{710455E1-DE52-36CF-EC8B-5E276D308D2A}"/>
+          <p:cNvPr id="10" name="ZoneTexte 9">
+            <a:extLst>
+              <a:ext uri="{FF2B5EF4-FFF2-40B4-BE49-F238E27FC236}">
+                <a16:creationId xmlns:a16="http://schemas.microsoft.com/office/drawing/2014/main" id="{135F641B-C1B3-18D8-A2DB-FA0721ABD48A}"/>
               </a:ext>
             </a:extLst>
           </p:cNvPr>
@@ -9084,8 +9143,8 @@
         </p:nvSpPr>
         <p:spPr>
           <a:xfrm>
-            <a:off x="8451587" y="3294179"/>
-            <a:ext cx="3280585" cy="1323439"/>
+            <a:off x="500932" y="5329855"/>
+            <a:ext cx="11519272" cy="707886"/>
           </a:xfrm>
           <a:prstGeom prst="rect">
             <a:avLst/>
@@ -9099,74 +9158,53 @@
           <a:lstStyle/>
           <a:p>
             <a:r>
-              <a:rPr lang="fr-FR" sz="2000" dirty="0"/>
-              <a:t>Ici les nombres de 2 à 10 ne seront jamais afficher car la boucle est stoppée dès qu’on atteint 2.</a:t>
-            </a:r>
-          </a:p>
-        </p:txBody>
-      </p:sp>
-      <p:sp>
-        <p:nvSpPr>
-          <p:cNvPr id="10" name="ZoneTexte 9">
-            <a:extLst>
-              <a:ext uri="{FF2B5EF4-FFF2-40B4-BE49-F238E27FC236}">
-                <a16:creationId xmlns:a16="http://schemas.microsoft.com/office/drawing/2014/main" id="{DF5DFA90-88B5-623C-03FA-9D414B84551E}"/>
-              </a:ext>
-            </a:extLst>
-          </p:cNvPr>
-          <p:cNvSpPr txBox="1"/>
-          <p:nvPr/>
-        </p:nvSpPr>
-        <p:spPr>
-          <a:xfrm>
-            <a:off x="442743" y="4555314"/>
-            <a:ext cx="11236639" cy="400110"/>
-          </a:xfrm>
-          <a:prstGeom prst="rect">
-            <a:avLst/>
-          </a:prstGeom>
-          <a:noFill/>
-        </p:spPr>
-        <p:txBody>
-          <a:bodyPr wrap="square" rtlCol="0">
-            <a:spAutoFit/>
-          </a:bodyPr>
-          <a:lstStyle/>
-          <a:p>
+              <a:rPr lang="fr-FR" sz="2000" dirty="0">
+                <a:latin typeface="Times New Roman" panose="02020603050405020304" pitchFamily="18" charset="0"/>
+                <a:cs typeface="Times New Roman" panose="02020603050405020304" pitchFamily="18" charset="0"/>
+              </a:rPr>
+              <a:t>Lorsqu’on tombe dans la condition où les variables </a:t>
+            </a:r>
+            <a:r>
+              <a:rPr lang="fr-FR" sz="2000" b="1" i="1" dirty="0">
+                <a:latin typeface="Times New Roman" panose="02020603050405020304" pitchFamily="18" charset="0"/>
+                <a:cs typeface="Times New Roman" panose="02020603050405020304" pitchFamily="18" charset="0"/>
+              </a:rPr>
+              <a:t>n/nb </a:t>
+            </a:r>
+            <a:r>
+              <a:rPr lang="fr-FR" sz="2000" dirty="0">
+                <a:latin typeface="Times New Roman" panose="02020603050405020304" pitchFamily="18" charset="0"/>
+                <a:cs typeface="Times New Roman" panose="02020603050405020304" pitchFamily="18" charset="0"/>
+              </a:rPr>
+              <a:t>sont égales à 2, le programme n’exécute pas le </a:t>
+            </a:r>
             <a:r>
               <a:rPr lang="fr-FR" sz="2000" b="1" dirty="0">
                 <a:latin typeface="Times New Roman" panose="02020603050405020304" pitchFamily="18" charset="0"/>
                 <a:cs typeface="Times New Roman" panose="02020603050405020304" pitchFamily="18" charset="0"/>
               </a:rPr>
-              <a:t>Les boucles infinies peuvent être générées avec </a:t>
+              <a:t>« </a:t>
             </a:r>
             <a:r>
               <a:rPr lang="fr-FR" sz="2000" b="1" i="1" dirty="0" err="1">
                 <a:latin typeface="Times New Roman" panose="02020603050405020304" pitchFamily="18" charset="0"/>
                 <a:cs typeface="Times New Roman" panose="02020603050405020304" pitchFamily="18" charset="0"/>
               </a:rPr>
-              <a:t>True</a:t>
+              <a:t>print</a:t>
             </a:r>
             <a:r>
               <a:rPr lang="fr-FR" sz="2000" b="1" dirty="0">
                 <a:latin typeface="Times New Roman" panose="02020603050405020304" pitchFamily="18" charset="0"/>
                 <a:cs typeface="Times New Roman" panose="02020603050405020304" pitchFamily="18" charset="0"/>
               </a:rPr>
-              <a:t> ou 1 associé à </a:t>
-            </a:r>
-            <a:r>
-              <a:rPr lang="fr-FR" sz="2000" b="1" i="1" dirty="0" err="1">
-                <a:latin typeface="Times New Roman" panose="02020603050405020304" pitchFamily="18" charset="0"/>
-                <a:cs typeface="Times New Roman" panose="02020603050405020304" pitchFamily="18" charset="0"/>
-              </a:rPr>
-              <a:t>while</a:t>
-            </a:r>
-            <a:r>
-              <a:rPr lang="fr-FR" sz="2000" b="1" dirty="0">
-                <a:latin typeface="Times New Roman" panose="02020603050405020304" pitchFamily="18" charset="0"/>
-                <a:cs typeface="Times New Roman" panose="02020603050405020304" pitchFamily="18" charset="0"/>
-              </a:rPr>
-              <a:t>.</a:t>
+              <a:t> » </a:t>
+            </a:r>
+            <a:r>
+              <a:rPr lang="fr-FR" sz="2000" dirty="0">
+                <a:latin typeface="Times New Roman" panose="02020603050405020304" pitchFamily="18" charset="0"/>
+                <a:cs typeface="Times New Roman" panose="02020603050405020304" pitchFamily="18" charset="0"/>
+              </a:rPr>
+              <a:t>suivant et passe à la valeur suivante de la séquence.</a:t>
             </a:r>
           </a:p>
         </p:txBody>
@@ -9176,7 +9214,7 @@
           <p:cNvPr id="12" name="Image 11">
             <a:extLst>
               <a:ext uri="{FF2B5EF4-FFF2-40B4-BE49-F238E27FC236}">
-                <a16:creationId xmlns:a16="http://schemas.microsoft.com/office/drawing/2014/main" id="{D774CEF5-CD17-4DBC-46FC-480C1E29F2BF}"/>
+                <a16:creationId xmlns:a16="http://schemas.microsoft.com/office/drawing/2014/main" id="{01C8E68F-A252-7B3F-7CAD-15D274F17598}"/>
               </a:ext>
             </a:extLst>
           </p:cNvPr>
@@ -9186,15 +9224,15 @@
           <p:nvPr/>
         </p:nvPicPr>
         <p:blipFill>
-          <a:blip r:embed="rId5"/>
+          <a:blip r:embed="rId4"/>
           <a:stretch>
             <a:fillRect/>
           </a:stretch>
         </p:blipFill>
         <p:spPr>
           <a:xfrm>
-            <a:off x="1476121" y="5004437"/>
-            <a:ext cx="7505700" cy="1028700"/>
+            <a:off x="506324" y="1928255"/>
+            <a:ext cx="5092700" cy="3296053"/>
           </a:xfrm>
           <a:prstGeom prst="rect">
             <a:avLst/>
@@ -9204,7 +9242,7 @@
     </p:spTree>
     <p:extLst>
       <p:ext uri="{BB962C8B-B14F-4D97-AF65-F5344CB8AC3E}">
-        <p14:creationId xmlns:p14="http://schemas.microsoft.com/office/powerpoint/2010/main" val="367398369"/>
+        <p14:creationId xmlns:p14="http://schemas.microsoft.com/office/powerpoint/2010/main" val="2297585284"/>
       </p:ext>
     </p:extLst>
   </p:cSld>
@@ -9329,7 +9367,7 @@
                 <a:latin typeface="Times New Roman" panose="02020603050405020304" pitchFamily="18" charset="0"/>
                 <a:cs typeface="Times New Roman" panose="02020603050405020304" pitchFamily="18" charset="0"/>
               </a:rPr>
-              <a:t>continue</a:t>
+              <a:t>break</a:t>
             </a:r>
           </a:p>
         </p:txBody>
@@ -9348,8 +9386,8 @@
         </p:nvSpPr>
         <p:spPr>
           <a:xfrm>
-            <a:off x="442743" y="767486"/>
-            <a:ext cx="11344704" cy="707886"/>
+            <a:off x="442743" y="754534"/>
+            <a:ext cx="11236639" cy="707886"/>
           </a:xfrm>
           <a:prstGeom prst="rect">
             <a:avLst/>
@@ -9367,7 +9405,14 @@
                 <a:latin typeface="Times New Roman" panose="02020603050405020304" pitchFamily="18" charset="0"/>
                 <a:cs typeface="Times New Roman" panose="02020603050405020304" pitchFamily="18" charset="0"/>
               </a:rPr>
-              <a:t>Le mot-clé </a:t>
+              <a:t>Contrairement à </a:t>
+            </a:r>
+            <a:r>
+              <a:rPr lang="fr-FR" sz="2000" b="1" dirty="0">
+                <a:latin typeface="Times New Roman" panose="02020603050405020304" pitchFamily="18" charset="0"/>
+                <a:cs typeface="Times New Roman" panose="02020603050405020304" pitchFamily="18" charset="0"/>
+              </a:rPr>
+              <a:t>l’instruction </a:t>
             </a:r>
             <a:r>
               <a:rPr lang="fr-FR" sz="2000" b="1" i="1" dirty="0">
@@ -9381,6 +9426,27 @@
                 <a:latin typeface="Times New Roman" panose="02020603050405020304" pitchFamily="18" charset="0"/>
                 <a:cs typeface="Times New Roman" panose="02020603050405020304" pitchFamily="18" charset="0"/>
               </a:rPr>
+              <a:t>, </a:t>
+            </a:r>
+            <a:r>
+              <a:rPr lang="fr-FR" sz="2000" dirty="0">
+                <a:latin typeface="Times New Roman" panose="02020603050405020304" pitchFamily="18" charset="0"/>
+                <a:cs typeface="Times New Roman" panose="02020603050405020304" pitchFamily="18" charset="0"/>
+              </a:rPr>
+              <a:t>ici le mot-clé </a:t>
+            </a:r>
+            <a:r>
+              <a:rPr lang="fr-FR" sz="2000" b="1" i="1" dirty="0">
+                <a:latin typeface="Times New Roman" panose="02020603050405020304" pitchFamily="18" charset="0"/>
+                <a:cs typeface="Times New Roman" panose="02020603050405020304" pitchFamily="18" charset="0"/>
+              </a:rPr>
+              <a:t>break</a:t>
+            </a:r>
+            <a:r>
+              <a:rPr lang="fr-FR" sz="2000" b="1" dirty="0">
+                <a:latin typeface="Times New Roman" panose="02020603050405020304" pitchFamily="18" charset="0"/>
+                <a:cs typeface="Times New Roman" panose="02020603050405020304" pitchFamily="18" charset="0"/>
+              </a:rPr>
               <a:t> </a:t>
             </a:r>
             <a:r>
@@ -9388,47 +9454,8 @@
                 <a:latin typeface="Times New Roman" panose="02020603050405020304" pitchFamily="18" charset="0"/>
                 <a:cs typeface="Times New Roman" panose="02020603050405020304" pitchFamily="18" charset="0"/>
               </a:rPr>
-              <a:t>en Python est utilisé dans les boucles pour continuer la boucle en repartant directement à la ligne de la condition du </a:t>
-            </a:r>
-            <a:r>
-              <a:rPr lang="fr-FR" sz="2000" b="1" i="1" dirty="0" err="1">
-                <a:latin typeface="Times New Roman" panose="02020603050405020304" pitchFamily="18" charset="0"/>
-                <a:cs typeface="Times New Roman" panose="02020603050405020304" pitchFamily="18" charset="0"/>
-              </a:rPr>
-              <a:t>while</a:t>
-            </a:r>
-            <a:r>
-              <a:rPr lang="fr-FR" sz="2000" b="1" dirty="0">
-                <a:latin typeface="Times New Roman" panose="02020603050405020304" pitchFamily="18" charset="0"/>
-                <a:cs typeface="Times New Roman" panose="02020603050405020304" pitchFamily="18" charset="0"/>
-              </a:rPr>
-              <a:t> </a:t>
-            </a:r>
-            <a:r>
-              <a:rPr lang="fr-FR" sz="2000" dirty="0">
-                <a:latin typeface="Times New Roman" panose="02020603050405020304" pitchFamily="18" charset="0"/>
-                <a:cs typeface="Times New Roman" panose="02020603050405020304" pitchFamily="18" charset="0"/>
-              </a:rPr>
-              <a:t>ou du </a:t>
-            </a:r>
-            <a:r>
-              <a:rPr lang="fr-FR" sz="2000" b="1" i="1" dirty="0">
-                <a:latin typeface="Times New Roman" panose="02020603050405020304" pitchFamily="18" charset="0"/>
-                <a:cs typeface="Times New Roman" panose="02020603050405020304" pitchFamily="18" charset="0"/>
-              </a:rPr>
-              <a:t>for</a:t>
-            </a:r>
-            <a:r>
-              <a:rPr lang="fr-FR" sz="2000" b="1" dirty="0">
-                <a:latin typeface="Times New Roman" panose="02020603050405020304" pitchFamily="18" charset="0"/>
-                <a:cs typeface="Times New Roman" panose="02020603050405020304" pitchFamily="18" charset="0"/>
-              </a:rPr>
-              <a:t>.</a:t>
-            </a:r>
-            <a:endParaRPr lang="fr-FR" sz="2000" dirty="0">
-              <a:latin typeface="Times New Roman" panose="02020603050405020304" pitchFamily="18" charset="0"/>
-              <a:cs typeface="Times New Roman" panose="02020603050405020304" pitchFamily="18" charset="0"/>
-            </a:endParaRPr>
+              <a:t>dans une boucle permet de la stopper complètement. Elle permettra par exemple de sortir des boucles infinies dans un programme.</a:t>
+            </a:r>
           </a:p>
         </p:txBody>
       </p:sp>
@@ -9471,50 +9498,12 @@
           </a:fontRef>
         </p:style>
       </p:cxnSp>
-      <p:sp>
-        <p:nvSpPr>
-          <p:cNvPr id="2" name="ZoneTexte 1">
-            <a:extLst>
-              <a:ext uri="{FF2B5EF4-FFF2-40B4-BE49-F238E27FC236}">
-                <a16:creationId xmlns:a16="http://schemas.microsoft.com/office/drawing/2014/main" id="{DC9E53F9-4B63-72E9-FEF0-8F1A4E56D9B7}"/>
-              </a:ext>
-            </a:extLst>
-          </p:cNvPr>
-          <p:cNvSpPr txBox="1"/>
-          <p:nvPr/>
-        </p:nvSpPr>
-        <p:spPr>
-          <a:xfrm>
-            <a:off x="442743" y="1481347"/>
-            <a:ext cx="11344704" cy="400110"/>
-          </a:xfrm>
-          <a:prstGeom prst="rect">
-            <a:avLst/>
-          </a:prstGeom>
-          <a:noFill/>
-        </p:spPr>
-        <p:txBody>
-          <a:bodyPr wrap="square" rtlCol="0">
-            <a:spAutoFit/>
-          </a:bodyPr>
-          <a:lstStyle/>
-          <a:p>
-            <a:r>
-              <a:rPr lang="fr-FR" sz="2000" dirty="0">
-                <a:latin typeface="Times New Roman" panose="02020603050405020304" pitchFamily="18" charset="0"/>
-                <a:cs typeface="Times New Roman" panose="02020603050405020304" pitchFamily="18" charset="0"/>
-              </a:rPr>
-              <a:t>Par exemple si on veut afficher la liste des nombres de 0 à 10 sauf le nombre 2 on aura:</a:t>
-            </a:r>
-          </a:p>
-        </p:txBody>
-      </p:sp>
       <p:pic>
         <p:nvPicPr>
-          <p:cNvPr id="8" name="Image 7">
-            <a:extLst>
-              <a:ext uri="{FF2B5EF4-FFF2-40B4-BE49-F238E27FC236}">
-                <a16:creationId xmlns:a16="http://schemas.microsoft.com/office/drawing/2014/main" id="{FE3553F1-79C8-8C5A-5356-1B0F2B7DAC60}"/>
+          <p:cNvPr id="2" name="Image 1">
+            <a:extLst>
+              <a:ext uri="{FF2B5EF4-FFF2-40B4-BE49-F238E27FC236}">
+                <a16:creationId xmlns:a16="http://schemas.microsoft.com/office/drawing/2014/main" id="{C4D1BCE3-F59E-D195-11EB-4525B95A92EC}"/>
               </a:ext>
             </a:extLst>
           </p:cNvPr>
@@ -9531,20 +9520,50 @@
         </p:blipFill>
         <p:spPr>
           <a:xfrm>
-            <a:off x="7958282" y="1987004"/>
-            <a:ext cx="3721100" cy="3237304"/>
+            <a:off x="500932" y="1543446"/>
+            <a:ext cx="6158747" cy="2804035"/>
           </a:xfrm>
           <a:prstGeom prst="rect">
             <a:avLst/>
           </a:prstGeom>
         </p:spPr>
       </p:pic>
-      <p:sp>
-        <p:nvSpPr>
-          <p:cNvPr id="9" name="Flèche vers la droite 8">
-            <a:extLst>
-              <a:ext uri="{FF2B5EF4-FFF2-40B4-BE49-F238E27FC236}">
-                <a16:creationId xmlns:a16="http://schemas.microsoft.com/office/drawing/2014/main" id="{E4EAF5A7-3AFE-58A6-8244-D1A2FFCB5565}"/>
+      <p:pic>
+        <p:nvPicPr>
+          <p:cNvPr id="7" name="Image 6">
+            <a:extLst>
+              <a:ext uri="{FF2B5EF4-FFF2-40B4-BE49-F238E27FC236}">
+                <a16:creationId xmlns:a16="http://schemas.microsoft.com/office/drawing/2014/main" id="{C7DF9E86-DE33-0136-F412-BE640BC767B5}"/>
+              </a:ext>
+            </a:extLst>
+          </p:cNvPr>
+          <p:cNvPicPr>
+            <a:picLocks noChangeAspect="1"/>
+          </p:cNvPicPr>
+          <p:nvPr/>
+        </p:nvPicPr>
+        <p:blipFill>
+          <a:blip r:embed="rId4"/>
+          <a:stretch>
+            <a:fillRect/>
+          </a:stretch>
+        </p:blipFill>
+        <p:spPr>
+          <a:xfrm>
+            <a:off x="8504380" y="1668212"/>
+            <a:ext cx="3175000" cy="1485900"/>
+          </a:xfrm>
+          <a:prstGeom prst="rect">
+            <a:avLst/>
+          </a:prstGeom>
+        </p:spPr>
+      </p:pic>
+      <p:sp>
+        <p:nvSpPr>
+          <p:cNvPr id="8" name="Flèche vers la droite 7">
+            <a:extLst>
+              <a:ext uri="{FF2B5EF4-FFF2-40B4-BE49-F238E27FC236}">
+                <a16:creationId xmlns:a16="http://schemas.microsoft.com/office/drawing/2014/main" id="{49FE3878-3BA4-C878-4C31-D5D7872BBC38}"/>
               </a:ext>
             </a:extLst>
           </p:cNvPr>
@@ -9553,8 +9572,8 @@
         </p:nvSpPr>
         <p:spPr>
           <a:xfrm>
-            <a:off x="5769608" y="3128140"/>
-            <a:ext cx="2018089" cy="756458"/>
+            <a:off x="6813534" y="2113200"/>
+            <a:ext cx="1536991" cy="756458"/>
           </a:xfrm>
           <a:prstGeom prst="rightArrow">
             <a:avLst/>
@@ -9593,10 +9612,10 @@
       </p:sp>
       <p:sp>
         <p:nvSpPr>
-          <p:cNvPr id="10" name="ZoneTexte 9">
-            <a:extLst>
-              <a:ext uri="{FF2B5EF4-FFF2-40B4-BE49-F238E27FC236}">
-                <a16:creationId xmlns:a16="http://schemas.microsoft.com/office/drawing/2014/main" id="{135F641B-C1B3-18D8-A2DB-FA0721ABD48A}"/>
+          <p:cNvPr id="9" name="ZoneTexte 8">
+            <a:extLst>
+              <a:ext uri="{FF2B5EF4-FFF2-40B4-BE49-F238E27FC236}">
+                <a16:creationId xmlns:a16="http://schemas.microsoft.com/office/drawing/2014/main" id="{710455E1-DE52-36CF-EC8B-5E276D308D2A}"/>
               </a:ext>
             </a:extLst>
           </p:cNvPr>
@@ -9605,8 +9624,8 @@
         </p:nvSpPr>
         <p:spPr>
           <a:xfrm>
-            <a:off x="500932" y="5329855"/>
-            <a:ext cx="11519272" cy="707886"/>
+            <a:off x="8451587" y="3294179"/>
+            <a:ext cx="3280585" cy="1323439"/>
           </a:xfrm>
           <a:prstGeom prst="rect">
             <a:avLst/>
@@ -9620,53 +9639,74 @@
           <a:lstStyle/>
           <a:p>
             <a:r>
-              <a:rPr lang="fr-FR" sz="2000" dirty="0">
-                <a:latin typeface="Times New Roman" panose="02020603050405020304" pitchFamily="18" charset="0"/>
-                <a:cs typeface="Times New Roman" panose="02020603050405020304" pitchFamily="18" charset="0"/>
-              </a:rPr>
-              <a:t>Lorsqu’on tombe dans la condition où les variables </a:t>
-            </a:r>
-            <a:r>
-              <a:rPr lang="fr-FR" sz="2000" b="1" i="1" dirty="0">
-                <a:latin typeface="Times New Roman" panose="02020603050405020304" pitchFamily="18" charset="0"/>
-                <a:cs typeface="Times New Roman" panose="02020603050405020304" pitchFamily="18" charset="0"/>
-              </a:rPr>
-              <a:t>n/nb </a:t>
-            </a:r>
-            <a:r>
-              <a:rPr lang="fr-FR" sz="2000" dirty="0">
-                <a:latin typeface="Times New Roman" panose="02020603050405020304" pitchFamily="18" charset="0"/>
-                <a:cs typeface="Times New Roman" panose="02020603050405020304" pitchFamily="18" charset="0"/>
-              </a:rPr>
-              <a:t>sont égales 2, le programme n’exécute pas le </a:t>
-            </a:r>
+              <a:rPr lang="fr-FR" sz="2000" dirty="0"/>
+              <a:t>Ici les nombres de 2 à 10 ne seront jamais afficher car la boucle est stoppée dès qu’on atteint 2.</a:t>
+            </a:r>
+          </a:p>
+        </p:txBody>
+      </p:sp>
+      <p:sp>
+        <p:nvSpPr>
+          <p:cNvPr id="10" name="ZoneTexte 9">
+            <a:extLst>
+              <a:ext uri="{FF2B5EF4-FFF2-40B4-BE49-F238E27FC236}">
+                <a16:creationId xmlns:a16="http://schemas.microsoft.com/office/drawing/2014/main" id="{DF5DFA90-88B5-623C-03FA-9D414B84551E}"/>
+              </a:ext>
+            </a:extLst>
+          </p:cNvPr>
+          <p:cNvSpPr txBox="1"/>
+          <p:nvPr/>
+        </p:nvSpPr>
+        <p:spPr>
+          <a:xfrm>
+            <a:off x="442743" y="4555314"/>
+            <a:ext cx="11236639" cy="400110"/>
+          </a:xfrm>
+          <a:prstGeom prst="rect">
+            <a:avLst/>
+          </a:prstGeom>
+          <a:noFill/>
+        </p:spPr>
+        <p:txBody>
+          <a:bodyPr wrap="square" rtlCol="0">
+            <a:spAutoFit/>
+          </a:bodyPr>
+          <a:lstStyle/>
+          <a:p>
             <a:r>
               <a:rPr lang="fr-FR" sz="2000" b="1" dirty="0">
                 <a:latin typeface="Times New Roman" panose="02020603050405020304" pitchFamily="18" charset="0"/>
                 <a:cs typeface="Times New Roman" panose="02020603050405020304" pitchFamily="18" charset="0"/>
               </a:rPr>
-              <a:t>« </a:t>
+              <a:t>Les boucles infinies peuvent être générées avec </a:t>
             </a:r>
             <a:r>
               <a:rPr lang="fr-FR" sz="2000" b="1" i="1" dirty="0" err="1">
                 <a:latin typeface="Times New Roman" panose="02020603050405020304" pitchFamily="18" charset="0"/>
                 <a:cs typeface="Times New Roman" panose="02020603050405020304" pitchFamily="18" charset="0"/>
               </a:rPr>
-              <a:t>print</a:t>
+              <a:t>True</a:t>
             </a:r>
             <a:r>
               <a:rPr lang="fr-FR" sz="2000" b="1" dirty="0">
                 <a:latin typeface="Times New Roman" panose="02020603050405020304" pitchFamily="18" charset="0"/>
                 <a:cs typeface="Times New Roman" panose="02020603050405020304" pitchFamily="18" charset="0"/>
               </a:rPr>
-              <a:t> » </a:t>
-            </a:r>
-            <a:r>
-              <a:rPr lang="fr-FR" sz="2000" dirty="0">
-                <a:latin typeface="Times New Roman" panose="02020603050405020304" pitchFamily="18" charset="0"/>
-                <a:cs typeface="Times New Roman" panose="02020603050405020304" pitchFamily="18" charset="0"/>
-              </a:rPr>
-              <a:t>suivant et passe à la valeur suivante de la séquence.</a:t>
+              <a:t> ou 1 associé à </a:t>
+            </a:r>
+            <a:r>
+              <a:rPr lang="fr-FR" sz="2000" b="1" i="1" dirty="0" err="1">
+                <a:latin typeface="Times New Roman" panose="02020603050405020304" pitchFamily="18" charset="0"/>
+                <a:cs typeface="Times New Roman" panose="02020603050405020304" pitchFamily="18" charset="0"/>
+              </a:rPr>
+              <a:t>while</a:t>
+            </a:r>
+            <a:r>
+              <a:rPr lang="fr-FR" sz="2000" b="1" dirty="0">
+                <a:latin typeface="Times New Roman" panose="02020603050405020304" pitchFamily="18" charset="0"/>
+                <a:cs typeface="Times New Roman" panose="02020603050405020304" pitchFamily="18" charset="0"/>
+              </a:rPr>
+              <a:t>.</a:t>
             </a:r>
           </a:p>
         </p:txBody>
@@ -9676,7 +9716,7 @@
           <p:cNvPr id="12" name="Image 11">
             <a:extLst>
               <a:ext uri="{FF2B5EF4-FFF2-40B4-BE49-F238E27FC236}">
-                <a16:creationId xmlns:a16="http://schemas.microsoft.com/office/drawing/2014/main" id="{01C8E68F-A252-7B3F-7CAD-15D274F17598}"/>
+                <a16:creationId xmlns:a16="http://schemas.microsoft.com/office/drawing/2014/main" id="{D774CEF5-CD17-4DBC-46FC-480C1E29F2BF}"/>
               </a:ext>
             </a:extLst>
           </p:cNvPr>
@@ -9686,15 +9726,15 @@
           <p:nvPr/>
         </p:nvPicPr>
         <p:blipFill>
-          <a:blip r:embed="rId4"/>
+          <a:blip r:embed="rId5"/>
           <a:stretch>
             <a:fillRect/>
           </a:stretch>
         </p:blipFill>
         <p:spPr>
           <a:xfrm>
-            <a:off x="506324" y="1928255"/>
-            <a:ext cx="5092700" cy="3296053"/>
+            <a:off x="1476121" y="5004437"/>
+            <a:ext cx="7505700" cy="1028700"/>
           </a:xfrm>
           <a:prstGeom prst="rect">
             <a:avLst/>
@@ -9704,7 +9744,7 @@
     </p:spTree>
     <p:extLst>
       <p:ext uri="{BB962C8B-B14F-4D97-AF65-F5344CB8AC3E}">
-        <p14:creationId xmlns:p14="http://schemas.microsoft.com/office/powerpoint/2010/main" val="2297585284"/>
+        <p14:creationId xmlns:p14="http://schemas.microsoft.com/office/powerpoint/2010/main" val="367398369"/>
       </p:ext>
     </p:extLst>
   </p:cSld>
@@ -12233,12 +12273,68 @@
           </a:p>
         </p:txBody>
       </p:sp>
+      <p:sp>
+        <p:nvSpPr>
+          <p:cNvPr id="15" name="ZoneTexte 14">
+            <a:extLst>
+              <a:ext uri="{FF2B5EF4-FFF2-40B4-BE49-F238E27FC236}">
+                <a16:creationId xmlns:a16="http://schemas.microsoft.com/office/drawing/2014/main" id="{26E08B24-44DE-D315-B26E-4234A03805D2}"/>
+              </a:ext>
+            </a:extLst>
+          </p:cNvPr>
+          <p:cNvSpPr txBox="1"/>
+          <p:nvPr/>
+        </p:nvSpPr>
+        <p:spPr>
+          <a:xfrm>
+            <a:off x="353471" y="2312164"/>
+            <a:ext cx="11569148" cy="400110"/>
+          </a:xfrm>
+          <a:prstGeom prst="rect">
+            <a:avLst/>
+          </a:prstGeom>
+          <a:noFill/>
+        </p:spPr>
+        <p:txBody>
+          <a:bodyPr wrap="square" rtlCol="0">
+            <a:spAutoFit/>
+          </a:bodyPr>
+          <a:lstStyle/>
+          <a:p>
+            <a:r>
+              <a:rPr lang="fr-FR" sz="2000" dirty="0">
+                <a:latin typeface="Times New Roman" panose="02020603050405020304" pitchFamily="18" charset="0"/>
+                <a:cs typeface="Times New Roman" panose="02020603050405020304" pitchFamily="18" charset="0"/>
+              </a:rPr>
+              <a:t>Ecrire un programme python équivalent à  celui-ci en utilisant cette fois-ci la boucle </a:t>
+            </a:r>
+            <a:r>
+              <a:rPr lang="fr-FR" sz="2000" b="1" i="1" dirty="0" err="1">
+                <a:latin typeface="Times New Roman" panose="02020603050405020304" pitchFamily="18" charset="0"/>
+                <a:cs typeface="Times New Roman" panose="02020603050405020304" pitchFamily="18" charset="0"/>
+              </a:rPr>
+              <a:t>while</a:t>
+            </a:r>
+            <a:r>
+              <a:rPr lang="fr-FR" sz="2000" b="1" dirty="0">
+                <a:latin typeface="Times New Roman" panose="02020603050405020304" pitchFamily="18" charset="0"/>
+                <a:cs typeface="Times New Roman" panose="02020603050405020304" pitchFamily="18" charset="0"/>
+              </a:rPr>
+              <a:t>.</a:t>
+            </a:r>
+            <a:endParaRPr lang="fr-FR" sz="2000" dirty="0">
+              <a:latin typeface="Times New Roman" panose="02020603050405020304" pitchFamily="18" charset="0"/>
+              <a:cs typeface="Times New Roman" panose="02020603050405020304" pitchFamily="18" charset="0"/>
+            </a:endParaRPr>
+          </a:p>
+        </p:txBody>
+      </p:sp>
       <p:pic>
         <p:nvPicPr>
-          <p:cNvPr id="9" name="Image 8">
-            <a:extLst>
-              <a:ext uri="{FF2B5EF4-FFF2-40B4-BE49-F238E27FC236}">
-                <a16:creationId xmlns:a16="http://schemas.microsoft.com/office/drawing/2014/main" id="{8A0DBBBE-4927-37C5-E79B-47731D9A0D3A}"/>
+          <p:cNvPr id="16" name="Image 15">
+            <a:extLst>
+              <a:ext uri="{FF2B5EF4-FFF2-40B4-BE49-F238E27FC236}">
+                <a16:creationId xmlns:a16="http://schemas.microsoft.com/office/drawing/2014/main" id="{C74E3DB3-90C7-1368-9F9A-D846E807BAF5}"/>
               </a:ext>
             </a:extLst>
           </p:cNvPr>
@@ -12249,92 +12345,6 @@
         </p:nvPicPr>
         <p:blipFill>
           <a:blip r:embed="rId3"/>
-          <a:stretch>
-            <a:fillRect/>
-          </a:stretch>
-        </p:blipFill>
-        <p:spPr>
-          <a:xfrm>
-            <a:off x="397565" y="2804356"/>
-            <a:ext cx="5068595" cy="2565400"/>
-          </a:xfrm>
-          <a:prstGeom prst="rect">
-            <a:avLst/>
-          </a:prstGeom>
-        </p:spPr>
-      </p:pic>
-      <p:sp>
-        <p:nvSpPr>
-          <p:cNvPr id="15" name="ZoneTexte 14">
-            <a:extLst>
-              <a:ext uri="{FF2B5EF4-FFF2-40B4-BE49-F238E27FC236}">
-                <a16:creationId xmlns:a16="http://schemas.microsoft.com/office/drawing/2014/main" id="{26E08B24-44DE-D315-B26E-4234A03805D2}"/>
-              </a:ext>
-            </a:extLst>
-          </p:cNvPr>
-          <p:cNvSpPr txBox="1"/>
-          <p:nvPr/>
-        </p:nvSpPr>
-        <p:spPr>
-          <a:xfrm>
-            <a:off x="353471" y="2312164"/>
-            <a:ext cx="11569148" cy="400110"/>
-          </a:xfrm>
-          <a:prstGeom prst="rect">
-            <a:avLst/>
-          </a:prstGeom>
-          <a:noFill/>
-        </p:spPr>
-        <p:txBody>
-          <a:bodyPr wrap="square" rtlCol="0">
-            <a:spAutoFit/>
-          </a:bodyPr>
-          <a:lstStyle/>
-          <a:p>
-            <a:r>
-              <a:rPr lang="fr-FR" sz="2000" dirty="0">
-                <a:latin typeface="Times New Roman" panose="02020603050405020304" pitchFamily="18" charset="0"/>
-                <a:cs typeface="Times New Roman" panose="02020603050405020304" pitchFamily="18" charset="0"/>
-              </a:rPr>
-              <a:t>Ecrire un programme python équivalent à  celui-ci en utilisant cette fois-ci la boucle </a:t>
-            </a:r>
-            <a:r>
-              <a:rPr lang="fr-FR" sz="2000" b="1" i="1" dirty="0" err="1">
-                <a:latin typeface="Times New Roman" panose="02020603050405020304" pitchFamily="18" charset="0"/>
-                <a:cs typeface="Times New Roman" panose="02020603050405020304" pitchFamily="18" charset="0"/>
-              </a:rPr>
-              <a:t>while</a:t>
-            </a:r>
-            <a:r>
-              <a:rPr lang="fr-FR" sz="2000" b="1" dirty="0">
-                <a:latin typeface="Times New Roman" panose="02020603050405020304" pitchFamily="18" charset="0"/>
-                <a:cs typeface="Times New Roman" panose="02020603050405020304" pitchFamily="18" charset="0"/>
-              </a:rPr>
-              <a:t>.</a:t>
-            </a:r>
-            <a:endParaRPr lang="fr-FR" sz="2000" dirty="0">
-              <a:latin typeface="Times New Roman" panose="02020603050405020304" pitchFamily="18" charset="0"/>
-              <a:cs typeface="Times New Roman" panose="02020603050405020304" pitchFamily="18" charset="0"/>
-            </a:endParaRPr>
-          </a:p>
-        </p:txBody>
-      </p:sp>
-      <p:pic>
-        <p:nvPicPr>
-          <p:cNvPr id="16" name="Image 15">
-            <a:extLst>
-              <a:ext uri="{FF2B5EF4-FFF2-40B4-BE49-F238E27FC236}">
-                <a16:creationId xmlns:a16="http://schemas.microsoft.com/office/drawing/2014/main" id="{C74E3DB3-90C7-1368-9F9A-D846E807BAF5}"/>
-              </a:ext>
-            </a:extLst>
-          </p:cNvPr>
-          <p:cNvPicPr>
-            <a:picLocks noChangeAspect="1"/>
-          </p:cNvPicPr>
-          <p:nvPr/>
-        </p:nvPicPr>
-        <p:blipFill>
-          <a:blip r:embed="rId4"/>
           <a:stretch>
             <a:fillRect/>
           </a:stretch>
@@ -12439,6 +12449,36 @@
           </a:p>
         </p:txBody>
       </p:sp>
+      <p:pic>
+        <p:nvPicPr>
+          <p:cNvPr id="2" name="Image 1">
+            <a:extLst>
+              <a:ext uri="{FF2B5EF4-FFF2-40B4-BE49-F238E27FC236}">
+                <a16:creationId xmlns:a16="http://schemas.microsoft.com/office/drawing/2014/main" id="{3F398971-BAAE-2597-B788-0656F15A2C93}"/>
+              </a:ext>
+            </a:extLst>
+          </p:cNvPr>
+          <p:cNvPicPr>
+            <a:picLocks noChangeAspect="1"/>
+          </p:cNvPicPr>
+          <p:nvPr/>
+        </p:nvPicPr>
+        <p:blipFill>
+          <a:blip r:embed="rId4"/>
+          <a:stretch>
+            <a:fillRect/>
+          </a:stretch>
+        </p:blipFill>
+        <p:spPr>
+          <a:xfrm>
+            <a:off x="397565" y="2810758"/>
+            <a:ext cx="5112059" cy="2462456"/>
+          </a:xfrm>
+          <a:prstGeom prst="rect">
+            <a:avLst/>
+          </a:prstGeom>
+        </p:spPr>
+      </p:pic>
     </p:spTree>
     <p:extLst>
       <p:ext uri="{BB962C8B-B14F-4D97-AF65-F5344CB8AC3E}">
@@ -17208,10 +17248,10 @@
       </p:cxnSp>
       <p:pic>
         <p:nvPicPr>
-          <p:cNvPr id="8" name="Image 7">
-            <a:extLst>
-              <a:ext uri="{FF2B5EF4-FFF2-40B4-BE49-F238E27FC236}">
-                <a16:creationId xmlns:a16="http://schemas.microsoft.com/office/drawing/2014/main" id="{1B85DD06-5A84-94C1-EBD3-88A7C8D8DCDE}"/>
+          <p:cNvPr id="9" name="Image 8">
+            <a:extLst>
+              <a:ext uri="{FF2B5EF4-FFF2-40B4-BE49-F238E27FC236}">
+                <a16:creationId xmlns:a16="http://schemas.microsoft.com/office/drawing/2014/main" id="{FA0CADBC-10FB-6916-3A46-F3818113749D}"/>
               </a:ext>
             </a:extLst>
           </p:cNvPr>
@@ -17222,36 +17262,6 @@
         </p:nvPicPr>
         <p:blipFill>
           <a:blip r:embed="rId3"/>
-          <a:stretch>
-            <a:fillRect/>
-          </a:stretch>
-        </p:blipFill>
-        <p:spPr>
-          <a:xfrm>
-            <a:off x="500932" y="2004229"/>
-            <a:ext cx="5068595" cy="2565400"/>
-          </a:xfrm>
-          <a:prstGeom prst="rect">
-            <a:avLst/>
-          </a:prstGeom>
-        </p:spPr>
-      </p:pic>
-      <p:pic>
-        <p:nvPicPr>
-          <p:cNvPr id="9" name="Image 8">
-            <a:extLst>
-              <a:ext uri="{FF2B5EF4-FFF2-40B4-BE49-F238E27FC236}">
-                <a16:creationId xmlns:a16="http://schemas.microsoft.com/office/drawing/2014/main" id="{FA0CADBC-10FB-6916-3A46-F3818113749D}"/>
-              </a:ext>
-            </a:extLst>
-          </p:cNvPr>
-          <p:cNvPicPr>
-            <a:picLocks noChangeAspect="1"/>
-          </p:cNvPicPr>
-          <p:nvPr/>
-        </p:nvPicPr>
-        <p:blipFill>
-          <a:blip r:embed="rId4"/>
           <a:stretch>
             <a:fillRect/>
           </a:stretch>
@@ -17524,6 +17534,36 @@
           </a:p>
         </p:txBody>
       </p:sp>
+      <p:pic>
+        <p:nvPicPr>
+          <p:cNvPr id="12" name="Image 11">
+            <a:extLst>
+              <a:ext uri="{FF2B5EF4-FFF2-40B4-BE49-F238E27FC236}">
+                <a16:creationId xmlns:a16="http://schemas.microsoft.com/office/drawing/2014/main" id="{E26747B2-CD2B-118B-8860-7E80C8B4F7C2}"/>
+              </a:ext>
+            </a:extLst>
+          </p:cNvPr>
+          <p:cNvPicPr>
+            <a:picLocks noChangeAspect="1"/>
+          </p:cNvPicPr>
+          <p:nvPr/>
+        </p:nvPicPr>
+        <p:blipFill>
+          <a:blip r:embed="rId4"/>
+          <a:stretch>
+            <a:fillRect/>
+          </a:stretch>
+        </p:blipFill>
+        <p:spPr>
+          <a:xfrm>
+            <a:off x="396857" y="2055702"/>
+            <a:ext cx="5112059" cy="2462456"/>
+          </a:xfrm>
+          <a:prstGeom prst="rect">
+            <a:avLst/>
+          </a:prstGeom>
+        </p:spPr>
+      </p:pic>
     </p:spTree>
     <p:extLst>
       <p:ext uri="{BB962C8B-B14F-4D97-AF65-F5344CB8AC3E}">

</xml_diff>